<commit_message>
Adds logic to make the query image faster
</commit_message>
<xml_diff>
--- a/weekly-slides/WEEK-3.pptx
+++ b/weekly-slides/WEEK-3.pptx
@@ -3596,7 +3596,7 @@
               <a:buChar char="•"/>
             </a:pPr>
             <a:r>
-              <a:rPr lang="en-US">
+              <a:rPr lang="en-US" dirty="0">
                 <a:solidFill>
                   <a:srgbClr val="000000"/>
                 </a:solidFill>
@@ -3610,7 +3610,7 @@
               <a:buChar char="•"/>
             </a:pPr>
             <a:r>
-              <a:rPr lang="en-US">
+              <a:rPr lang="en-US" dirty="0">
                 <a:solidFill>
                   <a:srgbClr val="000000"/>
                 </a:solidFill>
@@ -3624,12 +3624,28 @@
               <a:buChar char="•"/>
             </a:pPr>
             <a:r>
-              <a:rPr lang="en-US">
+              <a:rPr lang="en-US" dirty="0">
                 <a:solidFill>
                   <a:srgbClr val="000000"/>
                 </a:solidFill>
               </a:rPr>
-              <a:t>Adopted an implementation of DeepRanking to find similarity between images and built an image based query retrieval engine to get the top 5 best images. </a:t>
+              <a:t>Adopted an implementation of </a:t>
+            </a:r>
+            <a:r>
+              <a:rPr lang="en-US" b="1" dirty="0" err="1">
+                <a:solidFill>
+                  <a:srgbClr val="000000"/>
+                </a:solidFill>
+              </a:rPr>
+              <a:t>DeepRanking</a:t>
+            </a:r>
+            <a:r>
+              <a:rPr lang="en-US" dirty="0">
+                <a:solidFill>
+                  <a:srgbClr val="000000"/>
+                </a:solidFill>
+              </a:rPr>
+              <a:t> to find similarity between images and built an image based query retrieval engine to get the top 5 best images. </a:t>
             </a:r>
           </a:p>
           <a:p>
@@ -3638,7 +3654,7 @@
               <a:buChar char="•"/>
             </a:pPr>
             <a:r>
-              <a:rPr lang="en-US">
+              <a:rPr lang="en-US" dirty="0">
                 <a:solidFill>
                   <a:srgbClr val="000000"/>
                 </a:solidFill>

</xml_diff>